<commit_message>
Changed min/target api slide
</commit_message>
<xml_diff>
--- a/docs/Slides/1-Intro-4-FirstAppCode+More.pptx
+++ b/docs/Slides/1-Intro-4-FirstAppCode+More.pptx
@@ -237,14 +237,14 @@
           <a:effectLst/>
           <a:extLst>
             <a:ext uri="{909E8E84-426E-40dd-AFC4-6F175D3DCCD1}">
-              <a14:hiddenFill xmlns="" xmlns:a14="http://schemas.microsoft.com/office/drawing/2010/main">
+              <a14:hiddenFill xmlns:a14="http://schemas.microsoft.com/office/drawing/2010/main" xmlns="">
                 <a:solidFill>
                   <a:schemeClr val="accent1"/>
                 </a:solidFill>
               </a14:hiddenFill>
             </a:ext>
             <a:ext uri="{91240B29-F687-4f45-9708-019B960494DF}">
-              <a14:hiddenLine xmlns="" xmlns:a14="http://schemas.microsoft.com/office/drawing/2010/main" w="9525">
+              <a14:hiddenLine xmlns:a14="http://schemas.microsoft.com/office/drawing/2010/main" xmlns="" w="9525">
                 <a:solidFill>
                   <a:schemeClr val="tx1"/>
                 </a:solidFill>
@@ -254,7 +254,7 @@
               </a14:hiddenLine>
             </a:ext>
             <a:ext uri="{AF507438-7753-43e0-B8FC-AC1667EBCBE1}">
-              <a14:hiddenEffects xmlns="" xmlns:a14="http://schemas.microsoft.com/office/drawing/2010/main">
+              <a14:hiddenEffects xmlns:a14="http://schemas.microsoft.com/office/drawing/2010/main" xmlns="">
                 <a:effectLst>
                   <a:outerShdw dist="35921" dir="2700000" algn="ctr" rotWithShape="0">
                     <a:schemeClr val="bg2"/>
@@ -308,14 +308,14 @@
           <a:effectLst/>
           <a:extLst>
             <a:ext uri="{909E8E84-426E-40dd-AFC4-6F175D3DCCD1}">
-              <a14:hiddenFill xmlns="" xmlns:a14="http://schemas.microsoft.com/office/drawing/2010/main">
+              <a14:hiddenFill xmlns:a14="http://schemas.microsoft.com/office/drawing/2010/main" xmlns="">
                 <a:solidFill>
                   <a:schemeClr val="accent1"/>
                 </a:solidFill>
               </a14:hiddenFill>
             </a:ext>
             <a:ext uri="{91240B29-F687-4f45-9708-019B960494DF}">
-              <a14:hiddenLine xmlns="" xmlns:a14="http://schemas.microsoft.com/office/drawing/2010/main" w="9525">
+              <a14:hiddenLine xmlns:a14="http://schemas.microsoft.com/office/drawing/2010/main" xmlns="" w="9525">
                 <a:solidFill>
                   <a:schemeClr val="tx1"/>
                 </a:solidFill>
@@ -325,7 +325,7 @@
               </a14:hiddenLine>
             </a:ext>
             <a:ext uri="{AF507438-7753-43e0-B8FC-AC1667EBCBE1}">
-              <a14:hiddenEffects xmlns="" xmlns:a14="http://schemas.microsoft.com/office/drawing/2010/main">
+              <a14:hiddenEffects xmlns:a14="http://schemas.microsoft.com/office/drawing/2010/main" xmlns="">
                 <a:effectLst>
                   <a:outerShdw dist="35921" dir="2700000" algn="ctr" rotWithShape="0">
                     <a:schemeClr val="bg2"/>
@@ -355,7 +355,7 @@
               <a:pPr>
                 <a:defRPr/>
               </a:pPr>
-              <a:t>6/28/18</a:t>
+              <a:t>6/27/19</a:t>
             </a:fld>
             <a:endParaRPr lang="en-US"/>
           </a:p>
@@ -386,14 +386,14 @@
           <a:effectLst/>
           <a:extLst>
             <a:ext uri="{909E8E84-426E-40dd-AFC4-6F175D3DCCD1}">
-              <a14:hiddenFill xmlns="" xmlns:a14="http://schemas.microsoft.com/office/drawing/2010/main">
+              <a14:hiddenFill xmlns:a14="http://schemas.microsoft.com/office/drawing/2010/main" xmlns="">
                 <a:solidFill>
                   <a:schemeClr val="accent1"/>
                 </a:solidFill>
               </a14:hiddenFill>
             </a:ext>
             <a:ext uri="{91240B29-F687-4f45-9708-019B960494DF}">
-              <a14:hiddenLine xmlns="" xmlns:a14="http://schemas.microsoft.com/office/drawing/2010/main" w="9525">
+              <a14:hiddenLine xmlns:a14="http://schemas.microsoft.com/office/drawing/2010/main" xmlns="" w="9525">
                 <a:solidFill>
                   <a:schemeClr val="tx1"/>
                 </a:solidFill>
@@ -403,7 +403,7 @@
               </a14:hiddenLine>
             </a:ext>
             <a:ext uri="{AF507438-7753-43e0-B8FC-AC1667EBCBE1}">
-              <a14:hiddenEffects xmlns="" xmlns:a14="http://schemas.microsoft.com/office/drawing/2010/main">
+              <a14:hiddenEffects xmlns:a14="http://schemas.microsoft.com/office/drawing/2010/main" xmlns="">
                 <a:effectLst>
                   <a:outerShdw dist="35921" dir="2700000" algn="ctr" rotWithShape="0">
                     <a:schemeClr val="bg2"/>
@@ -457,14 +457,14 @@
           <a:effectLst/>
           <a:extLst>
             <a:ext uri="{909E8E84-426E-40dd-AFC4-6F175D3DCCD1}">
-              <a14:hiddenFill xmlns="" xmlns:a14="http://schemas.microsoft.com/office/drawing/2010/main">
+              <a14:hiddenFill xmlns:a14="http://schemas.microsoft.com/office/drawing/2010/main" xmlns="">
                 <a:solidFill>
                   <a:schemeClr val="accent1"/>
                 </a:solidFill>
               </a14:hiddenFill>
             </a:ext>
             <a:ext uri="{91240B29-F687-4f45-9708-019B960494DF}">
-              <a14:hiddenLine xmlns="" xmlns:a14="http://schemas.microsoft.com/office/drawing/2010/main" w="9525">
+              <a14:hiddenLine xmlns:a14="http://schemas.microsoft.com/office/drawing/2010/main" xmlns="" w="9525">
                 <a:solidFill>
                   <a:schemeClr val="tx1"/>
                 </a:solidFill>
@@ -474,7 +474,7 @@
               </a14:hiddenLine>
             </a:ext>
             <a:ext uri="{AF507438-7753-43e0-B8FC-AC1667EBCBE1}">
-              <a14:hiddenEffects xmlns="" xmlns:a14="http://schemas.microsoft.com/office/drawing/2010/main">
+              <a14:hiddenEffects xmlns:a14="http://schemas.microsoft.com/office/drawing/2010/main" xmlns="">
                 <a:effectLst>
                   <a:outerShdw dist="35921" dir="2700000" algn="ctr" rotWithShape="0">
                     <a:schemeClr val="bg2"/>
@@ -671,7 +671,7 @@
           </a:ln>
           <a:extLst>
             <a:ext uri="{909E8E84-426E-40dd-AFC4-6F175D3DCCD1}">
-              <a14:hiddenFill xmlns="" xmlns:a14="http://schemas.microsoft.com/office/drawing/2010/main">
+              <a14:hiddenFill xmlns:a14="http://schemas.microsoft.com/office/drawing/2010/main" xmlns="">
                 <a:solidFill>
                   <a:srgbClr val="FFFFFF"/>
                 </a:solidFill>
@@ -2596,14 +2596,14 @@
           </a:ln>
           <a:extLst>
             <a:ext uri="{909E8E84-426E-40dd-AFC4-6F175D3DCCD1}">
-              <a14:hiddenFill xmlns="" xmlns:a14="http://schemas.microsoft.com/office/drawing/2010/main">
+              <a14:hiddenFill xmlns:a14="http://schemas.microsoft.com/office/drawing/2010/main" xmlns="">
                 <a:solidFill>
                   <a:srgbClr val="FFFFFF"/>
                 </a:solidFill>
               </a14:hiddenFill>
             </a:ext>
             <a:ext uri="{91240B29-F687-4f45-9708-019B960494DF}">
-              <a14:hiddenLine xmlns="" xmlns:a14="http://schemas.microsoft.com/office/drawing/2010/main" w="9525">
+              <a14:hiddenLine xmlns:a14="http://schemas.microsoft.com/office/drawing/2010/main" xmlns="" w="9525">
                 <a:solidFill>
                   <a:srgbClr val="000000"/>
                 </a:solidFill>
@@ -2943,7 +2943,7 @@
           <a:p>
             <a:fld id="{12110144-19AD-4D4E-902D-E18AF93089D3}" type="datetimeFigureOut">
               <a:rPr lang="en-US" smtClean="0"/>
-              <a:t>6/28/18</a:t>
+              <a:t>6/27/19</a:t>
             </a:fld>
             <a:endParaRPr lang="en-US"/>
           </a:p>
@@ -3228,7 +3228,7 @@
           <a:p>
             <a:fld id="{12110144-19AD-4D4E-902D-E18AF93089D3}" type="datetimeFigureOut">
               <a:rPr lang="en-US" smtClean="0"/>
-              <a:t>6/28/18</a:t>
+              <a:t>6/27/19</a:t>
             </a:fld>
             <a:endParaRPr lang="en-US"/>
           </a:p>
@@ -3338,14 +3338,14 @@
           </a:ln>
           <a:extLst>
             <a:ext uri="{909E8E84-426E-40dd-AFC4-6F175D3DCCD1}">
-              <a14:hiddenFill xmlns="" xmlns:a14="http://schemas.microsoft.com/office/drawing/2010/main">
+              <a14:hiddenFill xmlns:a14="http://schemas.microsoft.com/office/drawing/2010/main" xmlns="">
                 <a:solidFill>
                   <a:srgbClr val="FFFFFF"/>
                 </a:solidFill>
               </a14:hiddenFill>
             </a:ext>
             <a:ext uri="{91240B29-F687-4f45-9708-019B960494DF}">
-              <a14:hiddenLine xmlns="" xmlns:a14="http://schemas.microsoft.com/office/drawing/2010/main" w="9525">
+              <a14:hiddenLine xmlns:a14="http://schemas.microsoft.com/office/drawing/2010/main" xmlns="" w="9525">
                 <a:solidFill>
                   <a:srgbClr val="000000"/>
                 </a:solidFill>
@@ -3396,14 +3396,14 @@
           </a:ln>
           <a:extLst>
             <a:ext uri="{909E8E84-426E-40dd-AFC4-6F175D3DCCD1}">
-              <a14:hiddenFill xmlns="" xmlns:a14="http://schemas.microsoft.com/office/drawing/2010/main">
+              <a14:hiddenFill xmlns:a14="http://schemas.microsoft.com/office/drawing/2010/main" xmlns="">
                 <a:solidFill>
                   <a:srgbClr val="FFFFFF"/>
                 </a:solidFill>
               </a14:hiddenFill>
             </a:ext>
             <a:ext uri="{91240B29-F687-4f45-9708-019B960494DF}">
-              <a14:hiddenLine xmlns="" xmlns:a14="http://schemas.microsoft.com/office/drawing/2010/main" w="9525">
+              <a14:hiddenLine xmlns:a14="http://schemas.microsoft.com/office/drawing/2010/main" xmlns="" w="9525">
                 <a:solidFill>
                   <a:srgbClr val="000000"/>
                 </a:solidFill>
@@ -5207,7 +5207,7 @@
 </file>
 
 <file path=ppt/slides/slide14.xml><?xml version="1.0" encoding="utf-8"?>
-<p:sld xmlns:a="http://schemas.openxmlformats.org/drawingml/2006/main" xmlns:r="http://schemas.openxmlformats.org/officeDocument/2006/relationships" xmlns:p="http://schemas.openxmlformats.org/presentationml/2006/main">
+<p:sld xmlns:a="http://schemas.openxmlformats.org/drawingml/2006/main" xmlns:r="http://schemas.openxmlformats.org/officeDocument/2006/relationships" xmlns:p="http://schemas.openxmlformats.org/presentationml/2006/main" show="0">
   <p:cSld>
     <p:spTree>
       <p:nvGrpSpPr>
@@ -5368,7 +5368,7 @@
           <a:graphicData uri="http://schemas.openxmlformats.org/presentationml/2006/ole">
             <mc:AlternateContent xmlns:mc="http://schemas.openxmlformats.org/markup-compatibility/2006">
               <mc:Choice xmlns:v="urn:schemas-microsoft-com:vml" Requires="v">
-                <p:oleObj spid="_x0000_s37893" name="Document" r:id="rId4" imgW="7301323" imgH="4576078" progId="Word.Document.12">
+                <p:oleObj spid="_x0000_s37897" name="Document" r:id="rId4" imgW="7301323" imgH="4576078" progId="Word.Document.12">
                   <p:embed/>
                 </p:oleObj>
               </mc:Choice>
@@ -5417,7 +5417,7 @@
 </file>
 
 <file path=ppt/slides/slide15.xml><?xml version="1.0" encoding="utf-8"?>
-<p:sld xmlns:a="http://schemas.openxmlformats.org/drawingml/2006/main" xmlns:r="http://schemas.openxmlformats.org/officeDocument/2006/relationships" xmlns:p="http://schemas.openxmlformats.org/presentationml/2006/main">
+<p:sld xmlns:a="http://schemas.openxmlformats.org/drawingml/2006/main" xmlns:r="http://schemas.openxmlformats.org/officeDocument/2006/relationships" xmlns:p="http://schemas.openxmlformats.org/presentationml/2006/main" show="0">
   <p:cSld>
     <p:spTree>
       <p:nvGrpSpPr>
@@ -5609,7 +5609,7 @@
 </file>
 
 <file path=ppt/slides/slide16.xml><?xml version="1.0" encoding="utf-8"?>
-<p:sld xmlns:a="http://schemas.openxmlformats.org/drawingml/2006/main" xmlns:r="http://schemas.openxmlformats.org/officeDocument/2006/relationships" xmlns:p="http://schemas.openxmlformats.org/presentationml/2006/main">
+<p:sld xmlns:a="http://schemas.openxmlformats.org/drawingml/2006/main" xmlns:r="http://schemas.openxmlformats.org/officeDocument/2006/relationships" xmlns:p="http://schemas.openxmlformats.org/presentationml/2006/main" show="0">
   <p:cSld>
     <p:spTree>
       <p:nvGrpSpPr>
@@ -5778,7 +5778,7 @@
           <a:graphicData uri="http://schemas.openxmlformats.org/presentationml/2006/ole">
             <mc:AlternateContent xmlns:mc="http://schemas.openxmlformats.org/markup-compatibility/2006">
               <mc:Choice xmlns:v="urn:schemas-microsoft-com:vml" Requires="v">
-                <p:oleObj spid="_x0000_s31770" name="Document" r:id="rId3" imgW="7301323" imgH="867039" progId="Word.Document.12">
+                <p:oleObj spid="_x0000_s31774" name="Document" r:id="rId3" imgW="7301323" imgH="867039" progId="Word.Document.12">
                   <p:embed/>
                 </p:oleObj>
               </mc:Choice>
@@ -6128,7 +6128,7 @@
           <a:graphicData uri="http://schemas.openxmlformats.org/presentationml/2006/ole">
             <mc:AlternateContent xmlns:mc="http://schemas.openxmlformats.org/markup-compatibility/2006">
               <mc:Choice xmlns:v="urn:schemas-microsoft-com:vml" Requires="v">
-                <p:oleObj spid="_x0000_s32794" name="Document" r:id="rId3" imgW="7301323" imgH="4979352" progId="Word.Document.12">
+                <p:oleObj spid="_x0000_s32798" name="Document" r:id="rId3" imgW="7301323" imgH="4979352" progId="Word.Document.12">
                   <p:embed/>
                 </p:oleObj>
               </mc:Choice>
@@ -6205,7 +6205,7 @@
         </p:nvSpPr>
         <p:spPr>
           <a:xfrm>
-            <a:off x="914400" y="716577"/>
+            <a:off x="914400" y="591661"/>
             <a:ext cx="7315200" cy="738664"/>
           </a:xfrm>
         </p:spPr>
@@ -6267,7 +6267,12 @@
             <p:ph type="ftr" sz="quarter" idx="11"/>
           </p:nvPr>
         </p:nvSpPr>
-        <p:spPr/>
+        <p:spPr>
+          <a:xfrm>
+            <a:off x="2895600" y="6248400"/>
+            <a:ext cx="3657600" cy="457200"/>
+          </a:xfrm>
+        </p:spPr>
         <p:txBody>
           <a:bodyPr/>
           <a:lstStyle/>
@@ -6276,8 +6281,16 @@
               <a:defRPr/>
             </a:pPr>
             <a:r>
-              <a:rPr lang="en-US"/>
-              <a:t>© 2015, Mike Murach &amp; Associates, Inc.</a:t>
+              <a:rPr lang="en-US" dirty="0"/>
+              <a:t>© 2015, Mike </a:t>
+            </a:r>
+            <a:r>
+              <a:rPr lang="en-US" dirty="0" err="1"/>
+              <a:t>Murach</a:t>
+            </a:r>
+            <a:r>
+              <a:rPr lang="en-US" dirty="0"/>
+              <a:t> &amp; Associates, Inc., Modified by Brian Bird, 2019</a:t>
             </a:r>
           </a:p>
         </p:txBody>
@@ -6336,25 +6349,25 @@
           <p:nvPr>
             <p:extLst>
               <p:ext uri="{D42A27DB-BD31-4B8C-83A1-F6EECF244321}">
-                <p14:modId xmlns:p14="http://schemas.microsoft.com/office/powerpoint/2010/main" val="3562650895"/>
+                <p14:modId xmlns:p14="http://schemas.microsoft.com/office/powerpoint/2010/main" val="2494171123"/>
               </p:ext>
             </p:extLst>
           </p:nvPr>
         </p:nvGraphicFramePr>
         <p:xfrm>
-          <a:off x="914400" y="1625600"/>
-          <a:ext cx="7313400" cy="2726440"/>
+          <a:off x="762000" y="1600201"/>
+          <a:ext cx="7848600" cy="1600200"/>
         </p:xfrm>
         <a:graphic>
           <a:graphicData uri="http://schemas.openxmlformats.org/presentationml/2006/ole">
             <mc:AlternateContent xmlns:mc="http://schemas.openxmlformats.org/markup-compatibility/2006">
               <mc:Choice xmlns:v="urn:schemas-microsoft-com:vml" Requires="v">
-                <p:oleObj spid="_x0000_s33818" name="Document" r:id="rId3" imgW="7313400" imgH="2726440" progId="Word.Document.12">
+                <p:oleObj spid="_x0000_s33822" name="Document" r:id="rId3" imgW="7315200" imgH="1333500" progId="Word.Document.12">
                   <p:embed/>
                 </p:oleObj>
               </mc:Choice>
               <mc:Fallback>
-                <p:oleObj name="Document" r:id="rId3" imgW="7313400" imgH="2726440" progId="Word.Document.12">
+                <p:oleObj name="Document" r:id="rId3" imgW="7315200" imgH="1333500" progId="Word.Document.12">
                   <p:embed/>
                   <p:pic>
                     <p:nvPicPr>
@@ -6370,8 +6383,8 @@
                     </p:blipFill>
                     <p:spPr>
                       <a:xfrm>
-                        <a:off x="914400" y="1625600"/>
-                        <a:ext cx="7313400" cy="2726440"/>
+                        <a:off x="762000" y="1600201"/>
+                        <a:ext cx="7848600" cy="1600200"/>
                       </a:xfrm>
                       <a:prstGeom prst="rect">
                         <a:avLst/>
@@ -6384,6 +6397,203 @@
           </a:graphicData>
         </a:graphic>
       </p:graphicFrame>
+      <p:sp>
+        <p:nvSpPr>
+          <p:cNvPr id="8" name="TextBox 7">
+            <a:extLst>
+              <a:ext uri="{FF2B5EF4-FFF2-40B4-BE49-F238E27FC236}">
+                <a16:creationId xmlns:a16="http://schemas.microsoft.com/office/drawing/2014/main" id="{872E4169-50A5-C642-B23D-7BA5FDC05BB0}"/>
+              </a:ext>
+            </a:extLst>
+          </p:cNvPr>
+          <p:cNvSpPr txBox="1"/>
+          <p:nvPr/>
+        </p:nvSpPr>
+        <p:spPr>
+          <a:xfrm>
+            <a:off x="609600" y="3200400"/>
+            <a:ext cx="7239000" cy="2923877"/>
+          </a:xfrm>
+          <a:prstGeom prst="rect">
+            <a:avLst/>
+          </a:prstGeom>
+          <a:noFill/>
+        </p:spPr>
+        <p:txBody>
+          <a:bodyPr wrap="square" rtlCol="0">
+            <a:spAutoFit/>
+          </a:bodyPr>
+          <a:lstStyle/>
+          <a:p>
+            <a:r>
+              <a:rPr lang="en-US" b="1" dirty="0">
+                <a:solidFill>
+                  <a:schemeClr val="accent2"/>
+                </a:solidFill>
+                <a:latin typeface="+mj-lt"/>
+              </a:rPr>
+              <a:t>Now specified in </a:t>
+            </a:r>
+            <a:r>
+              <a:rPr lang="en-US" b="1" i="1" dirty="0">
+                <a:solidFill>
+                  <a:schemeClr val="accent2"/>
+                </a:solidFill>
+                <a:latin typeface="+mj-lt"/>
+              </a:rPr>
+              <a:t>app/</a:t>
+            </a:r>
+            <a:r>
+              <a:rPr lang="en-US" b="1" i="1" dirty="0" err="1">
+                <a:solidFill>
+                  <a:schemeClr val="accent2"/>
+                </a:solidFill>
+                <a:latin typeface="+mj-lt"/>
+              </a:rPr>
+              <a:t>build.gradle</a:t>
+            </a:r>
+            <a:r>
+              <a:rPr lang="en-US" b="1" i="1" dirty="0">
+                <a:solidFill>
+                  <a:schemeClr val="accent2"/>
+                </a:solidFill>
+                <a:latin typeface="+mj-lt"/>
+              </a:rPr>
+              <a:t>:</a:t>
+            </a:r>
+          </a:p>
+          <a:p>
+            <a:r>
+              <a:rPr lang="en-US" sz="2000" dirty="0">
+                <a:latin typeface="Courier" pitchFamily="2" charset="0"/>
+              </a:rPr>
+              <a:t>android {</a:t>
+            </a:r>
+            <a:br>
+              <a:rPr lang="en-US" sz="2000" dirty="0">
+                <a:latin typeface="Courier" pitchFamily="2" charset="0"/>
+              </a:rPr>
+            </a:br>
+            <a:r>
+              <a:rPr lang="en-US" sz="2000" dirty="0">
+                <a:latin typeface="Courier" pitchFamily="2" charset="0"/>
+              </a:rPr>
+              <a:t>    </a:t>
+            </a:r>
+            <a:r>
+              <a:rPr lang="en-US" sz="2000" dirty="0" err="1">
+                <a:latin typeface="Courier" pitchFamily="2" charset="0"/>
+              </a:rPr>
+              <a:t>compileSdkVersion</a:t>
+            </a:r>
+            <a:r>
+              <a:rPr lang="en-US" sz="2000" dirty="0">
+                <a:latin typeface="Courier" pitchFamily="2" charset="0"/>
+              </a:rPr>
+              <a:t> 23</a:t>
+            </a:r>
+            <a:br>
+              <a:rPr lang="en-US" sz="2000" b="1" dirty="0">
+                <a:latin typeface="Courier" pitchFamily="2" charset="0"/>
+              </a:rPr>
+            </a:br>
+            <a:r>
+              <a:rPr lang="en-US" sz="2000" b="1" dirty="0">
+                <a:latin typeface="Courier" pitchFamily="2" charset="0"/>
+              </a:rPr>
+              <a:t>    . . . </a:t>
+            </a:r>
+            <a:br>
+              <a:rPr lang="en-US" sz="2000" b="1" dirty="0">
+                <a:latin typeface="Courier" pitchFamily="2" charset="0"/>
+              </a:rPr>
+            </a:br>
+            <a:r>
+              <a:rPr lang="en-US" sz="2000" b="1" dirty="0">
+                <a:latin typeface="Courier" pitchFamily="2" charset="0"/>
+              </a:rPr>
+              <a:t>    </a:t>
+            </a:r>
+            <a:r>
+              <a:rPr lang="en-US" sz="2000" dirty="0" err="1">
+                <a:latin typeface="Courier" pitchFamily="2" charset="0"/>
+              </a:rPr>
+              <a:t>defaultConfig</a:t>
+            </a:r>
+            <a:r>
+              <a:rPr lang="en-US" sz="2000" dirty="0">
+                <a:latin typeface="Courier" pitchFamily="2" charset="0"/>
+              </a:rPr>
+              <a:t> {</a:t>
+            </a:r>
+            <a:br>
+              <a:rPr lang="en-US" sz="2000" dirty="0">
+                <a:latin typeface="Courier" pitchFamily="2" charset="0"/>
+              </a:rPr>
+            </a:br>
+            <a:r>
+              <a:rPr lang="en-US" sz="2000" dirty="0">
+                <a:latin typeface="Courier" pitchFamily="2" charset="0"/>
+              </a:rPr>
+              <a:t>        . . . </a:t>
+            </a:r>
+            <a:br>
+              <a:rPr lang="en-US" sz="2000" dirty="0">
+                <a:latin typeface="Courier" pitchFamily="2" charset="0"/>
+              </a:rPr>
+            </a:br>
+            <a:r>
+              <a:rPr lang="en-US" sz="2000" dirty="0">
+                <a:latin typeface="Courier" pitchFamily="2" charset="0"/>
+              </a:rPr>
+              <a:t>        </a:t>
+            </a:r>
+            <a:r>
+              <a:rPr lang="en-US" sz="2000" dirty="0" err="1">
+                <a:latin typeface="Courier" pitchFamily="2" charset="0"/>
+              </a:rPr>
+              <a:t>minSdkVersion</a:t>
+            </a:r>
+            <a:r>
+              <a:rPr lang="en-US" sz="2000" dirty="0">
+                <a:latin typeface="Courier" pitchFamily="2" charset="0"/>
+              </a:rPr>
+              <a:t> 16</a:t>
+            </a:r>
+            <a:br>
+              <a:rPr lang="en-US" sz="2000" dirty="0">
+                <a:latin typeface="Courier" pitchFamily="2" charset="0"/>
+              </a:rPr>
+            </a:br>
+            <a:r>
+              <a:rPr lang="en-US" sz="2000" dirty="0">
+                <a:latin typeface="Courier" pitchFamily="2" charset="0"/>
+              </a:rPr>
+              <a:t>        </a:t>
+            </a:r>
+            <a:r>
+              <a:rPr lang="en-US" sz="2000" dirty="0" err="1">
+                <a:latin typeface="Courier" pitchFamily="2" charset="0"/>
+              </a:rPr>
+              <a:t>targetSdkVersion</a:t>
+            </a:r>
+            <a:r>
+              <a:rPr lang="en-US" sz="2000" dirty="0">
+                <a:latin typeface="Courier" pitchFamily="2" charset="0"/>
+              </a:rPr>
+              <a:t> 23</a:t>
+            </a:r>
+          </a:p>
+          <a:p>
+            <a:r>
+              <a:rPr lang="en-US" sz="2000" dirty="0">
+                <a:latin typeface="Courier" pitchFamily="2" charset="0"/>
+              </a:rPr>
+              <a:t>        . . .</a:t>
+            </a:r>
+          </a:p>
+        </p:txBody>
+      </p:sp>
     </p:spTree>
     <p:extLst>
       <p:ext uri="{BB962C8B-B14F-4D97-AF65-F5344CB8AC3E}">
@@ -7560,7 +7770,7 @@
           <a:graphicData uri="http://schemas.openxmlformats.org/presentationml/2006/ole">
             <mc:AlternateContent xmlns:mc="http://schemas.openxmlformats.org/markup-compatibility/2006">
               <mc:Choice xmlns:v="urn:schemas-microsoft-com:vml" Requires="v">
-                <p:oleObj spid="_x0000_s35866" name="Document" r:id="rId3" imgW="7301323" imgH="2819676" progId="Word.Document.12">
+                <p:oleObj spid="_x0000_s35870" name="Document" r:id="rId3" imgW="7301323" imgH="2819676" progId="Word.Document.12">
                   <p:embed/>
                 </p:oleObj>
               </mc:Choice>
@@ -8011,7 +8221,7 @@
           <a:graphicData uri="http://schemas.openxmlformats.org/presentationml/2006/ole">
             <mc:AlternateContent xmlns:mc="http://schemas.openxmlformats.org/markup-compatibility/2006">
               <mc:Choice xmlns:v="urn:schemas-microsoft-com:vml" Requires="v">
-                <p:oleObj spid="_x0000_s34842" name="Document" r:id="rId3" imgW="7301323" imgH="2492736" progId="Word.Document.12">
+                <p:oleObj spid="_x0000_s34846" name="Document" r:id="rId3" imgW="7301323" imgH="2492736" progId="Word.Document.12">
                   <p:embed/>
                 </p:oleObj>
               </mc:Choice>
@@ -9314,7 +9524,7 @@
           <a:graphicData uri="http://schemas.openxmlformats.org/presentationml/2006/ole">
             <mc:AlternateContent xmlns:mc="http://schemas.openxmlformats.org/markup-compatibility/2006">
               <mc:Choice xmlns:v="urn:schemas-microsoft-com:vml" Requires="v">
-                <p:oleObj spid="_x0000_s20507" name="Document" r:id="rId3" imgW="7315200" imgH="3238500" progId="Word.Document.12">
+                <p:oleObj spid="_x0000_s20511" name="Document" r:id="rId3" imgW="7315200" imgH="3238500" progId="Word.Document.12">
                   <p:embed/>
                 </p:oleObj>
               </mc:Choice>
@@ -9556,7 +9766,7 @@
           <a:graphicData uri="http://schemas.openxmlformats.org/presentationml/2006/ole">
             <mc:AlternateContent xmlns:mc="http://schemas.openxmlformats.org/markup-compatibility/2006">
               <mc:Choice xmlns:v="urn:schemas-microsoft-com:vml" Requires="v">
-                <p:oleObj spid="_x0000_s21533" name="Document" r:id="rId3" imgW="7301323" imgH="2076860" progId="Word.Document.12">
+                <p:oleObj spid="_x0000_s21537" name="Document" r:id="rId3" imgW="7301323" imgH="2076860" progId="Word.Document.12">
                   <p:embed/>
                 </p:oleObj>
               </mc:Choice>
@@ -9798,7 +10008,7 @@
           <a:graphicData uri="http://schemas.openxmlformats.org/presentationml/2006/ole">
             <mc:AlternateContent xmlns:mc="http://schemas.openxmlformats.org/markup-compatibility/2006">
               <mc:Choice xmlns:v="urn:schemas-microsoft-com:vml" Requires="v">
-                <p:oleObj spid="_x0000_s22558" name="Document" r:id="rId3" imgW="7301323" imgH="1875223" progId="Word.Document.12">
+                <p:oleObj spid="_x0000_s22562" name="Document" r:id="rId3" imgW="7301323" imgH="1875223" progId="Word.Document.12">
                   <p:embed/>
                 </p:oleObj>
               </mc:Choice>

</xml_diff>